<commit_message>
Topic 3-5; New deck for tested elements & exercise
Reformat topic 3-5 in ppt folder;
Added "WY added" slide for exam purpose
</commit_message>
<xml_diff>
--- a/ppt/2_Obj Func.pptx
+++ b/ppt/2_Obj Func.pptx
@@ -234,7 +234,7 @@
           <a:p>
             <a:fld id="{B5D7434C-48CE-114A-AD66-A0A76C8863DC}" type="datetimeFigureOut">
               <a:rPr lang="en-US" smtClean="0"/>
-              <a:t>12/24/21</a:t>
+              <a:t>12/27/21</a:t>
             </a:fld>
             <a:endParaRPr lang="en-US"/>
           </a:p>
@@ -1259,7 +1259,7 @@
             <a:fld id="{87DE6118-2437-4B30-8E3C-4D2BE6020583}" type="datetimeFigureOut">
               <a:rPr lang="en-US" dirty="0"/>
               <a:pPr/>
-              <a:t>12/24/21</a:t>
+              <a:t>12/27/21</a:t>
             </a:fld>
             <a:endParaRPr lang="en-US" dirty="0"/>
           </a:p>
@@ -1585,7 +1585,7 @@
           <a:p>
             <a:fld id="{87DE6118-2437-4B30-8E3C-4D2BE6020583}" type="datetimeFigureOut">
               <a:rPr lang="en-US" dirty="0"/>
-              <a:t>12/24/21</a:t>
+              <a:t>12/27/21</a:t>
             </a:fld>
             <a:endParaRPr lang="en-US" dirty="0"/>
           </a:p>
@@ -1760,7 +1760,7 @@
           <a:p>
             <a:fld id="{87DE6118-2437-4B30-8E3C-4D2BE6020583}" type="datetimeFigureOut">
               <a:rPr lang="en-US" dirty="0"/>
-              <a:t>12/24/21</a:t>
+              <a:t>12/27/21</a:t>
             </a:fld>
             <a:endParaRPr lang="en-US" dirty="0"/>
           </a:p>
@@ -1984,7 +1984,7 @@
           <a:p>
             <a:fld id="{1D8BD707-D9CF-40AE-B4C6-C98DA3205C09}" type="datetimeFigureOut">
               <a:rPr lang="en-US"/>
-              <a:t>12/24/21</a:t>
+              <a:t>12/27/21</a:t>
             </a:fld>
             <a:endParaRPr lang="en-US"/>
           </a:p>
@@ -2190,7 +2190,7 @@
           <a:p>
             <a:fld id="{87DE6118-2437-4B30-8E3C-4D2BE6020583}" type="datetimeFigureOut">
               <a:rPr lang="en-US" dirty="0"/>
-              <a:t>12/24/21</a:t>
+              <a:t>12/27/21</a:t>
             </a:fld>
             <a:endParaRPr lang="en-US" dirty="0"/>
           </a:p>
@@ -2473,7 +2473,7 @@
             <a:fld id="{87DE6118-2437-4B30-8E3C-4D2BE6020583}" type="datetimeFigureOut">
               <a:rPr lang="en-US" dirty="0"/>
               <a:pPr/>
-              <a:t>12/24/21</a:t>
+              <a:t>12/27/21</a:t>
             </a:fld>
             <a:endParaRPr lang="en-US" dirty="0"/>
           </a:p>
@@ -2863,7 +2863,7 @@
           <a:p>
             <a:fld id="{87DE6118-2437-4B30-8E3C-4D2BE6020583}" type="datetimeFigureOut">
               <a:rPr lang="en-US" dirty="0"/>
-              <a:t>12/24/21</a:t>
+              <a:t>12/27/21</a:t>
             </a:fld>
             <a:endParaRPr lang="en-US" dirty="0"/>
           </a:p>
@@ -3335,7 +3335,7 @@
           <a:p>
             <a:fld id="{87DE6118-2437-4B30-8E3C-4D2BE6020583}" type="datetimeFigureOut">
               <a:rPr lang="en-US" dirty="0"/>
-              <a:t>12/24/21</a:t>
+              <a:t>12/27/21</a:t>
             </a:fld>
             <a:endParaRPr lang="en-US" dirty="0"/>
           </a:p>
@@ -3448,7 +3448,7 @@
           <a:p>
             <a:fld id="{87DE6118-2437-4B30-8E3C-4D2BE6020583}" type="datetimeFigureOut">
               <a:rPr lang="en-US" dirty="0"/>
-              <a:t>12/24/21</a:t>
+              <a:t>12/27/21</a:t>
             </a:fld>
             <a:endParaRPr lang="en-US" dirty="0"/>
           </a:p>
@@ -3538,7 +3538,7 @@
           <a:p>
             <a:fld id="{87DE6118-2437-4B30-8E3C-4D2BE6020583}" type="datetimeFigureOut">
               <a:rPr lang="en-US" dirty="0"/>
-              <a:t>12/24/21</a:t>
+              <a:t>12/27/21</a:t>
             </a:fld>
             <a:endParaRPr lang="en-US" dirty="0"/>
           </a:p>
@@ -3880,7 +3880,7 @@
             <a:fld id="{87DE6118-2437-4B30-8E3C-4D2BE6020583}" type="datetimeFigureOut">
               <a:rPr lang="en-US" dirty="0"/>
               <a:pPr/>
-              <a:t>12/24/21</a:t>
+              <a:t>12/27/21</a:t>
             </a:fld>
             <a:endParaRPr lang="en-US" dirty="0"/>
           </a:p>
@@ -4265,7 +4265,7 @@
             <a:fld id="{87DE6118-2437-4B30-8E3C-4D2BE6020583}" type="datetimeFigureOut">
               <a:rPr lang="en-US" dirty="0"/>
               <a:pPr/>
-              <a:t>12/24/21</a:t>
+              <a:t>12/27/21</a:t>
             </a:fld>
             <a:endParaRPr lang="en-US" dirty="0"/>
           </a:p>
@@ -4540,7 +4540,7 @@
             <a:fld id="{87DE6118-2437-4B30-8E3C-4D2BE6020583}" type="datetimeFigureOut">
               <a:rPr lang="en-US" dirty="0"/>
               <a:pPr/>
-              <a:t>12/24/21</a:t>
+              <a:t>12/27/21</a:t>
             </a:fld>
             <a:endParaRPr lang="en-US" dirty="0"/>
           </a:p>
@@ -7102,7 +7102,7 @@
             <a:r>
               <a:rPr sz="3600" dirty="0">
                 <a:solidFill>
-                  <a:srgbClr val="252599"/>
+                  <a:schemeClr val="tx1"/>
                 </a:solidFill>
                 <a:latin typeface="Arial"/>
                 <a:cs typeface="Arial"/>
@@ -7112,7 +7112,7 @@
             <a:r>
               <a:rPr sz="3600" spc="-15" dirty="0">
                 <a:solidFill>
-                  <a:srgbClr val="252599"/>
+                  <a:schemeClr val="tx1"/>
                 </a:solidFill>
                 <a:latin typeface="Arial"/>
                 <a:cs typeface="Arial"/>
@@ -7122,7 +7122,7 @@
             <a:r>
               <a:rPr sz="3600" dirty="0">
                 <a:solidFill>
-                  <a:srgbClr val="252599"/>
+                  <a:schemeClr val="tx1"/>
                 </a:solidFill>
                 <a:latin typeface="Arial"/>
                 <a:cs typeface="Arial"/>
@@ -7132,27 +7132,37 @@
             <a:r>
               <a:rPr sz="3600" spc="-15" dirty="0">
                 <a:solidFill>
-                  <a:srgbClr val="252599"/>
-                </a:solidFill>
-                <a:latin typeface="Arial"/>
-                <a:cs typeface="Arial"/>
-              </a:rPr>
-              <a:t> </a:t>
+                  <a:schemeClr val="tx1"/>
+                </a:solidFill>
+                <a:latin typeface="Arial"/>
+                <a:cs typeface="Arial"/>
+              </a:rPr>
+              <a:t> </a:t>
+            </a:r>
+            <a:r>
+              <a:rPr lang="en-US" sz="3600" spc="-15" dirty="0">
+                <a:solidFill>
+                  <a:schemeClr val="tx1"/>
+                </a:solidFill>
+                <a:latin typeface="Arial"/>
+                <a:cs typeface="Arial"/>
+              </a:rPr>
+              <a:t>S</a:t>
             </a:r>
             <a:r>
               <a:rPr sz="3600" dirty="0">
                 <a:solidFill>
-                  <a:srgbClr val="252599"/>
-                </a:solidFill>
-                <a:latin typeface="Arial"/>
-                <a:cs typeface="Arial"/>
-              </a:rPr>
-              <a:t>sequenci</a:t>
+                  <a:schemeClr val="tx1"/>
+                </a:solidFill>
+                <a:latin typeface="Arial"/>
+                <a:cs typeface="Arial"/>
+              </a:rPr>
+              <a:t>equenci</a:t>
             </a:r>
             <a:r>
               <a:rPr sz="3600" spc="-15" dirty="0">
                 <a:solidFill>
-                  <a:srgbClr val="252599"/>
+                  <a:schemeClr val="tx1"/>
                 </a:solidFill>
                 <a:latin typeface="Arial"/>
                 <a:cs typeface="Arial"/>
@@ -7162,17 +7172,13 @@
             <a:r>
               <a:rPr sz="3600" dirty="0">
                 <a:solidFill>
-                  <a:srgbClr val="252599"/>
+                  <a:schemeClr val="tx1"/>
                 </a:solidFill>
                 <a:latin typeface="Arial"/>
                 <a:cs typeface="Arial"/>
               </a:rPr>
               <a:t>g</a:t>
             </a:r>
-            <a:endParaRPr sz="3600" dirty="0">
-              <a:latin typeface="Arial"/>
-              <a:cs typeface="Arial"/>
-            </a:endParaRPr>
           </a:p>
         </p:txBody>
       </p:sp>
@@ -7818,8 +7824,8 @@
         </p:nvSpPr>
         <p:spPr>
           <a:xfrm>
-            <a:off x="3870058" y="396286"/>
-            <a:ext cx="4728210" cy="430887"/>
+            <a:off x="3324961" y="396286"/>
+            <a:ext cx="6165619" cy="553998"/>
           </a:xfrm>
           <a:prstGeom prst="rect">
             <a:avLst/>
@@ -7837,7 +7843,7 @@
               </a:lnSpc>
             </a:pPr>
             <a:r>
-              <a:rPr sz="2800" spc="-165" dirty="0">
+              <a:rPr sz="3600" spc="-165" dirty="0">
                 <a:solidFill>
                   <a:srgbClr val="FF0000"/>
                 </a:solidFill>
@@ -7847,7 +7853,7 @@
               <a:t>T</a:t>
             </a:r>
             <a:r>
-              <a:rPr sz="2800" spc="-5" dirty="0">
+              <a:rPr sz="3600" spc="-5" dirty="0">
                 <a:solidFill>
                   <a:srgbClr val="FF0000"/>
                 </a:solidFill>
@@ -7857,7 +7863,7 @@
               <a:t>ry</a:t>
             </a:r>
             <a:r>
-              <a:rPr sz="2800" spc="10" dirty="0">
+              <a:rPr sz="3600" spc="10" dirty="0">
                 <a:solidFill>
                   <a:srgbClr val="FF0000"/>
                 </a:solidFill>
@@ -7867,7 +7873,7 @@
               <a:t> </a:t>
             </a:r>
             <a:r>
-              <a:rPr sz="2800" spc="-5" dirty="0">
+              <a:rPr sz="3600" spc="-5" dirty="0">
                 <a:solidFill>
                   <a:srgbClr val="FF0000"/>
                 </a:solidFill>
@@ -7877,7 +7883,7 @@
               <a:t>o</a:t>
             </a:r>
             <a:r>
-              <a:rPr sz="2800" spc="-15" dirty="0">
+              <a:rPr sz="3600" spc="-15" dirty="0">
                 <a:solidFill>
                   <a:srgbClr val="FF0000"/>
                 </a:solidFill>
@@ -7887,7 +7893,7 @@
               <a:t>u</a:t>
             </a:r>
             <a:r>
-              <a:rPr sz="2800" spc="-5" dirty="0">
+              <a:rPr sz="3600" spc="-5" dirty="0">
                 <a:solidFill>
                   <a:srgbClr val="FF0000"/>
                 </a:solidFill>
@@ -7897,7 +7903,7 @@
               <a:t>t</a:t>
             </a:r>
             <a:r>
-              <a:rPr sz="2800" spc="15" dirty="0">
+              <a:rPr sz="3600" spc="15" dirty="0">
                 <a:solidFill>
                   <a:srgbClr val="FF0000"/>
                 </a:solidFill>
@@ -7907,7 +7913,7 @@
               <a:t> </a:t>
             </a:r>
             <a:r>
-              <a:rPr sz="2800" spc="-5" dirty="0">
+              <a:rPr sz="3600" spc="-5" dirty="0">
                 <a:solidFill>
                   <a:srgbClr val="FF0000"/>
                 </a:solidFill>
@@ -7917,7 +7923,7 @@
               <a:t>:</a:t>
             </a:r>
             <a:r>
-              <a:rPr sz="2800" spc="10" dirty="0">
+              <a:rPr sz="3600" spc="10" dirty="0">
                 <a:solidFill>
                   <a:srgbClr val="FF0000"/>
                 </a:solidFill>
@@ -7927,97 +7933,97 @@
               <a:t> </a:t>
             </a:r>
             <a:r>
-              <a:rPr sz="2800" spc="-5" dirty="0">
+              <a:rPr sz="3600" spc="-5" dirty="0">
                 <a:latin typeface="Arial"/>
                 <a:cs typeface="Arial"/>
               </a:rPr>
               <a:t>h</a:t>
             </a:r>
             <a:r>
-              <a:rPr sz="2800" spc="-15" dirty="0">
+              <a:rPr sz="3600" spc="-15" dirty="0">
                 <a:latin typeface="Arial"/>
                 <a:cs typeface="Arial"/>
               </a:rPr>
               <a:t>o</a:t>
             </a:r>
             <a:r>
-              <a:rPr sz="2800" spc="-5" dirty="0">
+              <a:rPr sz="3600" spc="-5" dirty="0">
                 <a:latin typeface="Arial"/>
                 <a:cs typeface="Arial"/>
               </a:rPr>
               <a:t>w</a:t>
             </a:r>
             <a:r>
-              <a:rPr sz="2800" spc="5" dirty="0">
-                <a:latin typeface="Arial"/>
-                <a:cs typeface="Arial"/>
-              </a:rPr>
-              <a:t> </a:t>
-            </a:r>
-            <a:r>
-              <a:rPr sz="2800" spc="-5" dirty="0">
+              <a:rPr sz="3600" spc="5" dirty="0">
+                <a:latin typeface="Arial"/>
+                <a:cs typeface="Arial"/>
+              </a:rPr>
+              <a:t> </a:t>
+            </a:r>
+            <a:r>
+              <a:rPr sz="3600" spc="-5" dirty="0">
                 <a:latin typeface="Arial"/>
                 <a:cs typeface="Arial"/>
               </a:rPr>
               <a:t>d</a:t>
             </a:r>
             <a:r>
-              <a:rPr sz="2800" spc="-15" dirty="0">
+              <a:rPr sz="3600" spc="-15" dirty="0">
                 <a:latin typeface="Arial"/>
                 <a:cs typeface="Arial"/>
               </a:rPr>
               <a:t>o</a:t>
             </a:r>
             <a:r>
-              <a:rPr sz="2800" spc="-5" dirty="0">
+              <a:rPr sz="3600" spc="-5" dirty="0">
                 <a:latin typeface="Arial"/>
                 <a:cs typeface="Arial"/>
               </a:rPr>
               <a:t>es</a:t>
             </a:r>
             <a:r>
-              <a:rPr sz="2800" spc="30" dirty="0">
-                <a:latin typeface="Arial"/>
-                <a:cs typeface="Arial"/>
-              </a:rPr>
-              <a:t> </a:t>
-            </a:r>
-            <a:r>
-              <a:rPr sz="2800" spc="-5" dirty="0">
+              <a:rPr sz="3600" spc="30" dirty="0">
+                <a:latin typeface="Arial"/>
+                <a:cs typeface="Arial"/>
+              </a:rPr>
+              <a:t> </a:t>
+            </a:r>
+            <a:r>
+              <a:rPr sz="3600" spc="-5" dirty="0">
                 <a:latin typeface="Arial"/>
                 <a:cs typeface="Arial"/>
               </a:rPr>
               <a:t>it w</a:t>
             </a:r>
             <a:r>
-              <a:rPr sz="2800" spc="-15" dirty="0">
+              <a:rPr sz="3600" spc="-15" dirty="0">
                 <a:latin typeface="Arial"/>
                 <a:cs typeface="Arial"/>
               </a:rPr>
               <a:t>o</a:t>
             </a:r>
             <a:r>
-              <a:rPr sz="2800" spc="-5" dirty="0">
+              <a:rPr sz="3600" spc="-5" dirty="0">
                 <a:latin typeface="Arial"/>
                 <a:cs typeface="Arial"/>
               </a:rPr>
               <a:t>rk</a:t>
             </a:r>
             <a:r>
-              <a:rPr sz="2800" dirty="0">
-                <a:latin typeface="Arial"/>
-                <a:cs typeface="Arial"/>
-              </a:rPr>
-              <a:t> </a:t>
-            </a:r>
-            <a:r>
-              <a:rPr sz="2800" spc="-5" dirty="0">
+              <a:rPr sz="3600" dirty="0">
+                <a:latin typeface="Arial"/>
+                <a:cs typeface="Arial"/>
+              </a:rPr>
+              <a:t> </a:t>
+            </a:r>
+            <a:r>
+              <a:rPr sz="3600" spc="-5" dirty="0">
                 <a:latin typeface="Arial"/>
                 <a:cs typeface="Arial"/>
               </a:rPr>
               <a:t>?</a:t>
             </a:r>
-            <a:endParaRPr sz="2800">
+            <a:endParaRPr sz="3600" dirty="0">
               <a:latin typeface="Arial"/>
               <a:cs typeface="Arial"/>
             </a:endParaRPr>
@@ -31161,12 +31167,22 @@
                 <a:latin typeface="Arial"/>
                 <a:cs typeface="Arial"/>
               </a:rPr>
-              <a:t>Number systems</a:t>
-            </a:r>
-            <a:endParaRPr sz="3600">
-              <a:latin typeface="Arial"/>
-              <a:cs typeface="Arial"/>
-            </a:endParaRPr>
+              <a:t>Number </a:t>
+            </a:r>
+            <a:r>
+              <a:rPr lang="en-US" sz="3600" dirty="0">
+                <a:latin typeface="Arial"/>
+                <a:cs typeface="Arial"/>
+              </a:rPr>
+              <a:t>S</a:t>
+            </a:r>
+            <a:r>
+              <a:rPr sz="3600" dirty="0">
+                <a:latin typeface="Arial"/>
+                <a:cs typeface="Arial"/>
+              </a:rPr>
+              <a:t>ystems</a:t>
+            </a:r>
           </a:p>
         </p:txBody>
       </p:sp>

</xml_diff>